<commit_message>
refactor & powerpoint update
</commit_message>
<xml_diff>
--- a/DependencyInjectionCourse/Dependency Injection.pptx
+++ b/DependencyInjectionCourse/Dependency Injection.pptx
@@ -11,6 +11,7 @@
     <p:sldId id="259" r:id="rId5"/>
     <p:sldId id="261" r:id="rId6"/>
     <p:sldId id="260" r:id="rId7"/>
+    <p:sldId id="262" r:id="rId8"/>
   </p:sldIdLst>
   <p:sldSz cx="12192000" cy="6858000"/>
   <p:notesSz cx="6858000" cy="9144000"/>
@@ -248,7 +249,7 @@
           <a:p>
             <a:fld id="{F4F8E5AF-1A3E-45D4-84AD-F7F901731C12}" type="datetimeFigureOut">
               <a:rPr lang="en-US" smtClean="0"/>
-              <a:t>2/23/2017</a:t>
+              <a:t>2/26/2017</a:t>
             </a:fld>
             <a:endParaRPr lang="en-US"/>
           </a:p>
@@ -418,7 +419,7 @@
           <a:p>
             <a:fld id="{F4F8E5AF-1A3E-45D4-84AD-F7F901731C12}" type="datetimeFigureOut">
               <a:rPr lang="en-US" smtClean="0"/>
-              <a:t>2/23/2017</a:t>
+              <a:t>2/26/2017</a:t>
             </a:fld>
             <a:endParaRPr lang="en-US"/>
           </a:p>
@@ -598,7 +599,7 @@
           <a:p>
             <a:fld id="{F4F8E5AF-1A3E-45D4-84AD-F7F901731C12}" type="datetimeFigureOut">
               <a:rPr lang="en-US" smtClean="0"/>
-              <a:t>2/23/2017</a:t>
+              <a:t>2/26/2017</a:t>
             </a:fld>
             <a:endParaRPr lang="en-US"/>
           </a:p>
@@ -768,7 +769,7 @@
           <a:p>
             <a:fld id="{F4F8E5AF-1A3E-45D4-84AD-F7F901731C12}" type="datetimeFigureOut">
               <a:rPr lang="en-US" smtClean="0"/>
-              <a:t>2/23/2017</a:t>
+              <a:t>2/26/2017</a:t>
             </a:fld>
             <a:endParaRPr lang="en-US"/>
           </a:p>
@@ -1014,7 +1015,7 @@
           <a:p>
             <a:fld id="{F4F8E5AF-1A3E-45D4-84AD-F7F901731C12}" type="datetimeFigureOut">
               <a:rPr lang="en-US" smtClean="0"/>
-              <a:t>2/23/2017</a:t>
+              <a:t>2/26/2017</a:t>
             </a:fld>
             <a:endParaRPr lang="en-US"/>
           </a:p>
@@ -1246,7 +1247,7 @@
           <a:p>
             <a:fld id="{F4F8E5AF-1A3E-45D4-84AD-F7F901731C12}" type="datetimeFigureOut">
               <a:rPr lang="en-US" smtClean="0"/>
-              <a:t>2/23/2017</a:t>
+              <a:t>2/26/2017</a:t>
             </a:fld>
             <a:endParaRPr lang="en-US"/>
           </a:p>
@@ -1613,7 +1614,7 @@
           <a:p>
             <a:fld id="{F4F8E5AF-1A3E-45D4-84AD-F7F901731C12}" type="datetimeFigureOut">
               <a:rPr lang="en-US" smtClean="0"/>
-              <a:t>2/23/2017</a:t>
+              <a:t>2/26/2017</a:t>
             </a:fld>
             <a:endParaRPr lang="en-US"/>
           </a:p>
@@ -1731,7 +1732,7 @@
           <a:p>
             <a:fld id="{F4F8E5AF-1A3E-45D4-84AD-F7F901731C12}" type="datetimeFigureOut">
               <a:rPr lang="en-US" smtClean="0"/>
-              <a:t>2/23/2017</a:t>
+              <a:t>2/26/2017</a:t>
             </a:fld>
             <a:endParaRPr lang="en-US"/>
           </a:p>
@@ -1826,7 +1827,7 @@
           <a:p>
             <a:fld id="{F4F8E5AF-1A3E-45D4-84AD-F7F901731C12}" type="datetimeFigureOut">
               <a:rPr lang="en-US" smtClean="0"/>
-              <a:t>2/23/2017</a:t>
+              <a:t>2/26/2017</a:t>
             </a:fld>
             <a:endParaRPr lang="en-US"/>
           </a:p>
@@ -2103,7 +2104,7 @@
           <a:p>
             <a:fld id="{F4F8E5AF-1A3E-45D4-84AD-F7F901731C12}" type="datetimeFigureOut">
               <a:rPr lang="en-US" smtClean="0"/>
-              <a:t>2/23/2017</a:t>
+              <a:t>2/26/2017</a:t>
             </a:fld>
             <a:endParaRPr lang="en-US"/>
           </a:p>
@@ -2356,7 +2357,7 @@
           <a:p>
             <a:fld id="{F4F8E5AF-1A3E-45D4-84AD-F7F901731C12}" type="datetimeFigureOut">
               <a:rPr lang="en-US" smtClean="0"/>
-              <a:t>2/23/2017</a:t>
+              <a:t>2/26/2017</a:t>
             </a:fld>
             <a:endParaRPr lang="en-US"/>
           </a:p>
@@ -2569,7 +2570,7 @@
           <a:p>
             <a:fld id="{F4F8E5AF-1A3E-45D4-84AD-F7F901731C12}" type="datetimeFigureOut">
               <a:rPr lang="en-US" smtClean="0"/>
-              <a:t>2/23/2017</a:t>
+              <a:t>2/26/2017</a:t>
             </a:fld>
             <a:endParaRPr lang="en-US"/>
           </a:p>
@@ -3055,6 +3056,13 @@
   <p:clrMapOvr>
     <a:masterClrMapping/>
   </p:clrMapOvr>
+  <p:timing>
+    <p:tnLst>
+      <p:par>
+        <p:cTn id="1" dur="indefinite" restart="never" nodeType="tmRoot"/>
+      </p:par>
+    </p:tnLst>
+  </p:timing>
 </p:sld>
 </file>
 
@@ -3189,6 +3197,13 @@
   <p:clrMapOvr>
     <a:masterClrMapping/>
   </p:clrMapOvr>
+  <p:timing>
+    <p:tnLst>
+      <p:par>
+        <p:cTn id="1" dur="indefinite" restart="never" nodeType="tmRoot"/>
+      </p:par>
+    </p:tnLst>
+  </p:timing>
 </p:sld>
 </file>
 
@@ -3353,6 +3368,13 @@
   <p:clrMapOvr>
     <a:masterClrMapping/>
   </p:clrMapOvr>
+  <p:timing>
+    <p:tnLst>
+      <p:par>
+        <p:cTn id="1" dur="indefinite" restart="never" nodeType="tmRoot"/>
+      </p:par>
+    </p:tnLst>
+  </p:timing>
 </p:sld>
 </file>
 
@@ -3560,6 +3582,13 @@
   <p:clrMapOvr>
     <a:masterClrMapping/>
   </p:clrMapOvr>
+  <p:timing>
+    <p:tnLst>
+      <p:par>
+        <p:cTn id="1" dur="indefinite" restart="never" nodeType="tmRoot"/>
+      </p:par>
+    </p:tnLst>
+  </p:timing>
 </p:sld>
 </file>
 
@@ -3616,6 +3645,13 @@
   <p:clrMapOvr>
     <a:masterClrMapping/>
   </p:clrMapOvr>
+  <p:timing>
+    <p:tnLst>
+      <p:par>
+        <p:cTn id="1" dur="indefinite" restart="never" nodeType="tmRoot"/>
+      </p:par>
+    </p:tnLst>
+  </p:timing>
 </p:sld>
 </file>
 
@@ -3711,6 +3747,162 @@
   <p:clrMapOvr>
     <a:masterClrMapping/>
   </p:clrMapOvr>
+  <p:timing>
+    <p:tnLst>
+      <p:par>
+        <p:cTn id="1" dur="indefinite" restart="never" nodeType="tmRoot"/>
+      </p:par>
+    </p:tnLst>
+  </p:timing>
+</p:sld>
+</file>
+
+<file path=ppt/slides/slide7.xml><?xml version="1.0" encoding="utf-8"?>
+<p:sld xmlns:a="http://schemas.openxmlformats.org/drawingml/2006/main" xmlns:r="http://schemas.openxmlformats.org/officeDocument/2006/relationships" xmlns:p="http://schemas.openxmlformats.org/presentationml/2006/main">
+  <p:cSld>
+    <p:spTree>
+      <p:nvGrpSpPr>
+        <p:cNvPr id="1" name=""/>
+        <p:cNvGrpSpPr/>
+        <p:nvPr/>
+      </p:nvGrpSpPr>
+      <p:grpSpPr>
+        <a:xfrm>
+          <a:off x="0" y="0"/>
+          <a:ext cx="0" cy="0"/>
+          <a:chOff x="0" y="0"/>
+          <a:chExt cx="0" cy="0"/>
+        </a:xfrm>
+      </p:grpSpPr>
+      <p:sp>
+        <p:nvSpPr>
+          <p:cNvPr id="2" name="Title 1"/>
+          <p:cNvSpPr>
+            <a:spLocks noGrp="1"/>
+          </p:cNvSpPr>
+          <p:nvPr>
+            <p:ph type="title"/>
+          </p:nvPr>
+        </p:nvSpPr>
+        <p:spPr/>
+        <p:txBody>
+          <a:bodyPr/>
+          <a:lstStyle/>
+          <a:p>
+            <a:r>
+              <a:rPr lang="en-US" dirty="0" smtClean="0"/>
+              <a:t>Advanced </a:t>
+            </a:r>
+            <a:r>
+              <a:rPr lang="en-US" dirty="0" smtClean="0">
+                <a:solidFill>
+                  <a:schemeClr val="accent2"/>
+                </a:solidFill>
+              </a:rPr>
+              <a:t>Dependency Injection</a:t>
+            </a:r>
+            <a:endParaRPr lang="en-US" dirty="0">
+              <a:solidFill>
+                <a:schemeClr val="accent2"/>
+              </a:solidFill>
+            </a:endParaRPr>
+          </a:p>
+        </p:txBody>
+      </p:sp>
+      <p:sp>
+        <p:nvSpPr>
+          <p:cNvPr id="3" name="Content Placeholder 2"/>
+          <p:cNvSpPr>
+            <a:spLocks noGrp="1"/>
+          </p:cNvSpPr>
+          <p:nvPr>
+            <p:ph idx="1"/>
+          </p:nvPr>
+        </p:nvSpPr>
+        <p:spPr/>
+        <p:txBody>
+          <a:bodyPr/>
+          <a:lstStyle/>
+          <a:p>
+            <a:r>
+              <a:rPr lang="en-US" b="1" dirty="0" smtClean="0"/>
+              <a:t>Interception</a:t>
+            </a:r>
+            <a:r>
+              <a:rPr lang="en-US" dirty="0" smtClean="0"/>
+              <a:t> Mechanism &amp; Benefits, Use Cases</a:t>
+            </a:r>
+          </a:p>
+          <a:p>
+            <a:endParaRPr lang="en-US" dirty="0" smtClean="0"/>
+          </a:p>
+          <a:p>
+            <a:r>
+              <a:rPr lang="en-US" b="1" dirty="0" smtClean="0"/>
+              <a:t>Conventional</a:t>
+            </a:r>
+            <a:r>
+              <a:rPr lang="en-US" dirty="0" smtClean="0"/>
+              <a:t> Dependency Injection</a:t>
+            </a:r>
+          </a:p>
+          <a:p>
+            <a:endParaRPr lang="en-US" dirty="0" smtClean="0"/>
+          </a:p>
+          <a:p>
+            <a:r>
+              <a:rPr lang="en-US" b="1" dirty="0" smtClean="0"/>
+              <a:t>Unit Testing </a:t>
+            </a:r>
+            <a:r>
+              <a:rPr lang="en-US" dirty="0" smtClean="0"/>
+              <a:t>With Dependency Injection</a:t>
+            </a:r>
+          </a:p>
+          <a:p>
+            <a:pPr lvl="1"/>
+            <a:r>
+              <a:rPr lang="en-US" dirty="0" smtClean="0"/>
+              <a:t>Auto-Mocking Container</a:t>
+            </a:r>
+          </a:p>
+          <a:p>
+            <a:pPr lvl="1"/>
+            <a:r>
+              <a:rPr lang="en-US" dirty="0" err="1" smtClean="0"/>
+              <a:t>AutoFixture</a:t>
+            </a:r>
+            <a:endParaRPr lang="en-US" dirty="0" smtClean="0"/>
+          </a:p>
+          <a:p>
+            <a:pPr lvl="1"/>
+            <a:endParaRPr lang="en-US" dirty="0" smtClean="0"/>
+          </a:p>
+          <a:p>
+            <a:endParaRPr lang="en-US" dirty="0" smtClean="0"/>
+          </a:p>
+          <a:p>
+            <a:endParaRPr lang="en-US" dirty="0"/>
+          </a:p>
+        </p:txBody>
+      </p:sp>
+    </p:spTree>
+    <p:extLst>
+      <p:ext uri="{BB962C8B-B14F-4D97-AF65-F5344CB8AC3E}">
+        <p14:creationId xmlns:p14="http://schemas.microsoft.com/office/powerpoint/2010/main" val="1271093183"/>
+      </p:ext>
+    </p:extLst>
+  </p:cSld>
+  <p:clrMapOvr>
+    <a:masterClrMapping/>
+  </p:clrMapOvr>
+  <p:timing>
+    <p:tnLst>
+      <p:par>
+        <p:cTn id="1" dur="indefinite" restart="never" nodeType="tmRoot"/>
+      </p:par>
+    </p:tnLst>
+  </p:timing>
 </p:sld>
 </file>
 

</xml_diff>